<commit_message>
Progress on presentation / test
</commit_message>
<xml_diff>
--- a/Sprint Presentations/team_review_Sprint_1.pptx
+++ b/Sprint Presentations/team_review_Sprint_1.pptx
@@ -5,10 +5,11 @@
     <p:sldMasterId id="2147483659" r:id="rId1"/>
   </p:sldMasterIdLst>
   <p:notesMasterIdLst>
-    <p:notesMasterId r:id="rId3"/>
+    <p:notesMasterId r:id="rId4"/>
   </p:notesMasterIdLst>
   <p:sldIdLst>
     <p:sldId id="256" r:id="rId2"/>
+    <p:sldId id="257" r:id="rId3"/>
   </p:sldIdLst>
   <p:sldSz cx="9144000" cy="5143500" type="screen16x9"/>
   <p:notesSz cx="6858000" cy="9144000"/>
@@ -5620,7 +5621,7 @@
           <p:nvPr>
             <p:extLst>
               <p:ext uri="{D42A27DB-BD31-4B8C-83A1-F6EECF244321}">
-                <p14:modId xmlns:p14="http://schemas.microsoft.com/office/powerpoint/2010/main" val="1006067097"/>
+                <p14:modId xmlns:p14="http://schemas.microsoft.com/office/powerpoint/2010/main" val="1733707547"/>
               </p:ext>
             </p:extLst>
           </p:nvPr>
@@ -5883,11 +5884,7 @@
                       </a:pPr>
                       <a:r>
                         <a:rPr lang="en" sz="1050" dirty="0"/>
-                        <a:t>Established roles </a:t>
-                      </a:r>
-                      <a:r>
-                        <a:rPr lang="en" sz="1050"/>
-                        <a:t>and assignments</a:t>
+                        <a:t>Established roles and assignments</a:t>
                       </a:r>
                       <a:endParaRPr sz="1050" dirty="0"/>
                     </a:p>
@@ -5999,7 +5996,7 @@
                             <a:schemeClr val="dk1"/>
                           </a:solidFill>
                         </a:rPr>
-                        <a:t>Item 1</a:t>
+                        <a:t>Initializing / finishing envirnment set up</a:t>
                       </a:r>
                       <a:endParaRPr sz="1050" dirty="0">
                         <a:solidFill>
@@ -6202,7 +6199,7 @@
                       </a:pPr>
                       <a:r>
                         <a:rPr lang="en" sz="1050" dirty="0"/>
-                        <a:t>Item 1</a:t>
+                        <a:t>Assign Specifc Roles for work (Backend or Frontend etc)</a:t>
                       </a:r>
                       <a:endParaRPr sz="1050" dirty="0"/>
                     </a:p>
@@ -6217,10 +6214,6 @@
                         <a:buSzPts val="1400"/>
                         <a:buChar char="●"/>
                       </a:pPr>
-                      <a:r>
-                        <a:rPr lang="en" sz="1050" dirty="0"/>
-                        <a:t>Item 2</a:t>
-                      </a:r>
                       <a:endParaRPr sz="1050" dirty="0"/>
                     </a:p>
                     <a:p>
@@ -6288,6 +6281,110 @@
         </a:graphic>
       </p:graphicFrame>
     </p:spTree>
+  </p:cSld>
+  <p:clrMapOvr>
+    <a:masterClrMapping/>
+  </p:clrMapOvr>
+</p:sld>
+</file>
+
+<file path=ppt/slides/slide2.xml><?xml version="1.0" encoding="utf-8"?>
+<p:sld xmlns:a="http://schemas.openxmlformats.org/drawingml/2006/main" xmlns:r="http://schemas.openxmlformats.org/officeDocument/2006/relationships" xmlns:p="http://schemas.openxmlformats.org/presentationml/2006/main">
+  <p:cSld>
+    <p:spTree>
+      <p:nvGrpSpPr>
+        <p:cNvPr id="1" name=""/>
+        <p:cNvGrpSpPr/>
+        <p:nvPr/>
+      </p:nvGrpSpPr>
+      <p:grpSpPr>
+        <a:xfrm>
+          <a:off x="0" y="0"/>
+          <a:ext cx="0" cy="0"/>
+          <a:chOff x="0" y="0"/>
+          <a:chExt cx="0" cy="0"/>
+        </a:xfrm>
+      </p:grpSpPr>
+      <p:sp>
+        <p:nvSpPr>
+          <p:cNvPr id="2" name="Title 1">
+            <a:extLst>
+              <a:ext uri="{FF2B5EF4-FFF2-40B4-BE49-F238E27FC236}">
+                <a16:creationId xmlns:a16="http://schemas.microsoft.com/office/drawing/2014/main" id="{C5F7ED97-DEE7-CE5E-99EA-02142F67036D}"/>
+              </a:ext>
+            </a:extLst>
+          </p:cNvPr>
+          <p:cNvSpPr>
+            <a:spLocks noGrp="1"/>
+          </p:cNvSpPr>
+          <p:nvPr>
+            <p:ph type="title"/>
+          </p:nvPr>
+        </p:nvSpPr>
+        <p:spPr/>
+        <p:txBody>
+          <a:bodyPr>
+            <a:normAutofit fontScale="90000"/>
+          </a:bodyPr>
+          <a:lstStyle/>
+          <a:p>
+            <a:endParaRPr lang="en-US" dirty="0"/>
+          </a:p>
+        </p:txBody>
+      </p:sp>
+      <p:pic>
+        <p:nvPicPr>
+          <p:cNvPr id="1026" name="Picture 2">
+            <a:extLst>
+              <a:ext uri="{FF2B5EF4-FFF2-40B4-BE49-F238E27FC236}">
+                <a16:creationId xmlns:a16="http://schemas.microsoft.com/office/drawing/2014/main" id="{F3A7A779-AD71-F7C5-7130-EC4E6504C370}"/>
+              </a:ext>
+            </a:extLst>
+          </p:cNvPr>
+          <p:cNvPicPr>
+            <a:picLocks noChangeAspect="1" noChangeArrowheads="1"/>
+          </p:cNvPicPr>
+          <p:nvPr/>
+        </p:nvPicPr>
+        <p:blipFill rotWithShape="1">
+          <a:blip r:embed="rId2">
+            <a:extLst>
+              <a:ext uri="{28A0092B-C50C-407E-A947-70E740481C1C}">
+                <a14:useLocalDpi xmlns:a14="http://schemas.microsoft.com/office/drawing/2010/main" val="0"/>
+              </a:ext>
+            </a:extLst>
+          </a:blip>
+          <a:srcRect t="25252" b="35565"/>
+          <a:stretch>
+            <a:fillRect/>
+          </a:stretch>
+        </p:blipFill>
+        <p:spPr bwMode="auto">
+          <a:xfrm>
+            <a:off x="311700" y="1368360"/>
+            <a:ext cx="8601584" cy="2527814"/>
+          </a:xfrm>
+          <a:prstGeom prst="rect">
+            <a:avLst/>
+          </a:prstGeom>
+          <a:noFill/>
+          <a:extLst>
+            <a:ext uri="{909E8E84-426E-40DD-AFC4-6F175D3DCCD1}">
+              <a14:hiddenFill xmlns:a14="http://schemas.microsoft.com/office/drawing/2010/main">
+                <a:solidFill>
+                  <a:srgbClr val="FFFFFF"/>
+                </a:solidFill>
+              </a14:hiddenFill>
+            </a:ext>
+          </a:extLst>
+        </p:spPr>
+      </p:pic>
+    </p:spTree>
+    <p:extLst>
+      <p:ext uri="{BB962C8B-B14F-4D97-AF65-F5344CB8AC3E}">
+        <p14:creationId xmlns:p14="http://schemas.microsoft.com/office/powerpoint/2010/main" val="3863309491"/>
+      </p:ext>
+    </p:extLst>
   </p:cSld>
   <p:clrMapOvr>
     <a:masterClrMapping/>

</xml_diff>